<commit_message>
Modified: grid layout; Added: database structure for MyCabin App
</commit_message>
<xml_diff>
--- a/Cabana_app/Business Plan.pptx
+++ b/Cabana_app/Business Plan.pptx
@@ -259,7 +259,7 @@
           <a:p>
             <a:fld id="{E2917DF1-60C6-456C-8419-3433D0B44653}" type="datetimeFigureOut">
               <a:rPr lang="en-US" smtClean="0"/>
-              <a:t>1/24/2024</a:t>
+              <a:t>2/18/2024</a:t>
             </a:fld>
             <a:endParaRPr lang="en-US"/>
           </a:p>
@@ -457,7 +457,7 @@
           <a:p>
             <a:fld id="{E2917DF1-60C6-456C-8419-3433D0B44653}" type="datetimeFigureOut">
               <a:rPr lang="en-US" smtClean="0"/>
-              <a:t>1/24/2024</a:t>
+              <a:t>2/18/2024</a:t>
             </a:fld>
             <a:endParaRPr lang="en-US"/>
           </a:p>
@@ -665,7 +665,7 @@
           <a:p>
             <a:fld id="{E2917DF1-60C6-456C-8419-3433D0B44653}" type="datetimeFigureOut">
               <a:rPr lang="en-US" smtClean="0"/>
-              <a:t>1/24/2024</a:t>
+              <a:t>2/18/2024</a:t>
             </a:fld>
             <a:endParaRPr lang="en-US"/>
           </a:p>
@@ -863,7 +863,7 @@
           <a:p>
             <a:fld id="{E2917DF1-60C6-456C-8419-3433D0B44653}" type="datetimeFigureOut">
               <a:rPr lang="en-US" smtClean="0"/>
-              <a:t>1/24/2024</a:t>
+              <a:t>2/18/2024</a:t>
             </a:fld>
             <a:endParaRPr lang="en-US"/>
           </a:p>
@@ -1138,7 +1138,7 @@
           <a:p>
             <a:fld id="{E2917DF1-60C6-456C-8419-3433D0B44653}" type="datetimeFigureOut">
               <a:rPr lang="en-US" smtClean="0"/>
-              <a:t>1/24/2024</a:t>
+              <a:t>2/18/2024</a:t>
             </a:fld>
             <a:endParaRPr lang="en-US"/>
           </a:p>
@@ -1403,7 +1403,7 @@
           <a:p>
             <a:fld id="{E2917DF1-60C6-456C-8419-3433D0B44653}" type="datetimeFigureOut">
               <a:rPr lang="en-US" smtClean="0"/>
-              <a:t>1/24/2024</a:t>
+              <a:t>2/18/2024</a:t>
             </a:fld>
             <a:endParaRPr lang="en-US"/>
           </a:p>
@@ -1815,7 +1815,7 @@
           <a:p>
             <a:fld id="{E2917DF1-60C6-456C-8419-3433D0B44653}" type="datetimeFigureOut">
               <a:rPr lang="en-US" smtClean="0"/>
-              <a:t>1/24/2024</a:t>
+              <a:t>2/18/2024</a:t>
             </a:fld>
             <a:endParaRPr lang="en-US"/>
           </a:p>
@@ -1956,7 +1956,7 @@
           <a:p>
             <a:fld id="{E2917DF1-60C6-456C-8419-3433D0B44653}" type="datetimeFigureOut">
               <a:rPr lang="en-US" smtClean="0"/>
-              <a:t>1/24/2024</a:t>
+              <a:t>2/18/2024</a:t>
             </a:fld>
             <a:endParaRPr lang="en-US"/>
           </a:p>
@@ -2069,7 +2069,7 @@
           <a:p>
             <a:fld id="{E2917DF1-60C6-456C-8419-3433D0B44653}" type="datetimeFigureOut">
               <a:rPr lang="en-US" smtClean="0"/>
-              <a:t>1/24/2024</a:t>
+              <a:t>2/18/2024</a:t>
             </a:fld>
             <a:endParaRPr lang="en-US"/>
           </a:p>
@@ -2380,7 +2380,7 @@
           <a:p>
             <a:fld id="{E2917DF1-60C6-456C-8419-3433D0B44653}" type="datetimeFigureOut">
               <a:rPr lang="en-US" smtClean="0"/>
-              <a:t>1/24/2024</a:t>
+              <a:t>2/18/2024</a:t>
             </a:fld>
             <a:endParaRPr lang="en-US"/>
           </a:p>
@@ -2668,7 +2668,7 @@
           <a:p>
             <a:fld id="{E2917DF1-60C6-456C-8419-3433D0B44653}" type="datetimeFigureOut">
               <a:rPr lang="en-US" smtClean="0"/>
-              <a:t>1/24/2024</a:t>
+              <a:t>2/18/2024</a:t>
             </a:fld>
             <a:endParaRPr lang="en-US"/>
           </a:p>
@@ -2909,7 +2909,7 @@
           <a:p>
             <a:fld id="{E2917DF1-60C6-456C-8419-3433D0B44653}" type="datetimeFigureOut">
               <a:rPr lang="en-US" smtClean="0"/>
-              <a:t>1/24/2024</a:t>
+              <a:t>2/18/2024</a:t>
             </a:fld>
             <a:endParaRPr lang="en-US"/>
           </a:p>
@@ -5428,6 +5428,65 @@
           </p:txBody>
         </p:sp>
       </p:grpSp>
+      <p:sp>
+        <p:nvSpPr>
+          <p:cNvPr id="3" name="Rectangle 2">
+            <a:extLst>
+              <a:ext uri="{FF2B5EF4-FFF2-40B4-BE49-F238E27FC236}">
+                <a16:creationId xmlns:a16="http://schemas.microsoft.com/office/drawing/2014/main" id="{04A43D58-6981-731A-954A-07D6289265AE}"/>
+              </a:ext>
+            </a:extLst>
+          </p:cNvPr>
+          <p:cNvSpPr/>
+          <p:nvPr/>
+        </p:nvSpPr>
+        <p:spPr>
+          <a:xfrm>
+            <a:off x="8245643" y="2161862"/>
+            <a:ext cx="2504892" cy="1424356"/>
+          </a:xfrm>
+          <a:prstGeom prst="rect">
+            <a:avLst/>
+          </a:prstGeom>
+          <a:noFill/>
+          <a:ln w="76200">
+            <a:solidFill>
+              <a:srgbClr val="FF0000"/>
+            </a:solidFill>
+          </a:ln>
+          <a:effectLst>
+            <a:glow rad="355600">
+              <a:srgbClr val="FF0000">
+                <a:alpha val="40000"/>
+              </a:srgbClr>
+            </a:glow>
+          </a:effectLst>
+        </p:spPr>
+        <p:style>
+          <a:lnRef idx="2">
+            <a:schemeClr val="accent1">
+              <a:shade val="15000"/>
+            </a:schemeClr>
+          </a:lnRef>
+          <a:fillRef idx="1">
+            <a:schemeClr val="accent1"/>
+          </a:fillRef>
+          <a:effectRef idx="0">
+            <a:schemeClr val="accent1"/>
+          </a:effectRef>
+          <a:fontRef idx="minor">
+            <a:schemeClr val="lt1"/>
+          </a:fontRef>
+        </p:style>
+        <p:txBody>
+          <a:bodyPr rtlCol="0" anchor="ctr"/>
+          <a:lstStyle/>
+          <a:p>
+            <a:pPr algn="ctr"/>
+            <a:endParaRPr lang="en-US"/>
+          </a:p>
+        </p:txBody>
+      </p:sp>
     </p:spTree>
     <p:extLst>
       <p:ext uri="{BB962C8B-B14F-4D97-AF65-F5344CB8AC3E}">

</xml_diff>